<commit_message>
Fixed applications input, image placement and final PPT generator
</commit_message>
<xml_diff>
--- a/shubh.pptx
+++ b/shubh.pptx
@@ -150,6 +150,139 @@
 </p:cmAuthorLst>
 </file>
 
+<file path=ppt/revisionInfo.xml><?xml version="1.0" encoding="utf-8"?>
+<p1510:revInfo xmlns:a="http://schemas.openxmlformats.org/drawingml/2006/main" xmlns:r="http://schemas.openxmlformats.org/officeDocument/2006/relationships" xmlns:p1510="http://schemas.microsoft.com/office/powerpoint/2015/10/main">
+  <p1510:revLst>
+    <p1510:client id="{F843F239-16C9-4E0D-80B5-BC417E275172}" v="4" dt="2026-02-06T15:22:56.004"/>
+  </p1510:revLst>
+</p1510:revInfo>
+</file>
+
+<file path=ppt/changesInfos/changesInfo1.xml><?xml version="1.0" encoding="utf-8"?>
+<pc:chgInfo xmlns:a="http://schemas.openxmlformats.org/drawingml/2006/main" xmlns:r="http://schemas.openxmlformats.org/officeDocument/2006/relationships" xmlns:ac="http://schemas.microsoft.com/office/drawing/2013/main/command" xmlns:pc="http://schemas.microsoft.com/office/powerpoint/2013/main/command">
+  <pc:docChgLst>
+    <pc:chgData name="Shubham Hegishte" userId="bdee4fbff53a6376" providerId="LiveId" clId="{D66986CE-3744-4817-B2C5-7FA4B1ED5BE1}"/>
+    <pc:docChg chg="undo custSel modSld modMainMaster">
+      <pc:chgData name="Shubham Hegishte" userId="bdee4fbff53a6376" providerId="LiveId" clId="{D66986CE-3744-4817-B2C5-7FA4B1ED5BE1}" dt="2026-02-06T15:28:28.324" v="46" actId="20577"/>
+      <pc:docMkLst>
+        <pc:docMk/>
+      </pc:docMkLst>
+      <pc:sldChg chg="addSp delSp modSp mod">
+        <pc:chgData name="Shubham Hegishte" userId="bdee4fbff53a6376" providerId="LiveId" clId="{D66986CE-3744-4817-B2C5-7FA4B1ED5BE1}" dt="2026-02-06T15:28:28.324" v="46" actId="20577"/>
+        <pc:sldMkLst>
+          <pc:docMk/>
+          <pc:sldMk cId="0" sldId="720"/>
+        </pc:sldMkLst>
+        <pc:spChg chg="mod">
+          <ac:chgData name="Shubham Hegishte" userId="bdee4fbff53a6376" providerId="LiveId" clId="{D66986CE-3744-4817-B2C5-7FA4B1ED5BE1}" dt="2026-02-04T14:44:16.945" v="17" actId="1076"/>
+          <ac:spMkLst>
+            <pc:docMk/>
+            <pc:sldMk cId="0" sldId="720"/>
+            <ac:spMk id="2" creationId="{A8087D22-6204-18FA-F238-CCEDA757282F}"/>
+          </ac:spMkLst>
+        </pc:spChg>
+        <pc:spChg chg="add mod">
+          <ac:chgData name="Shubham Hegishte" userId="bdee4fbff53a6376" providerId="LiveId" clId="{D66986CE-3744-4817-B2C5-7FA4B1ED5BE1}" dt="2026-02-06T15:23:18.853" v="40" actId="20577"/>
+          <ac:spMkLst>
+            <pc:docMk/>
+            <pc:sldMk cId="0" sldId="720"/>
+            <ac:spMk id="8" creationId="{2B49B05E-B816-F429-B1B0-D318CDF6FBBB}"/>
+          </ac:spMkLst>
+        </pc:spChg>
+        <pc:spChg chg="mod">
+          <ac:chgData name="Shubham Hegishte" userId="bdee4fbff53a6376" providerId="LiveId" clId="{D66986CE-3744-4817-B2C5-7FA4B1ED5BE1}" dt="2026-02-04T14:29:12.886" v="1" actId="14100"/>
+          <ac:spMkLst>
+            <pc:docMk/>
+            <pc:sldMk cId="0" sldId="720"/>
+            <ac:spMk id="9" creationId="{4086E503-26E5-F9F3-9F8D-7C63EA2436C0}"/>
+          </ac:spMkLst>
+        </pc:spChg>
+        <pc:spChg chg="add mod">
+          <ac:chgData name="Shubham Hegishte" userId="bdee4fbff53a6376" providerId="LiveId" clId="{D66986CE-3744-4817-B2C5-7FA4B1ED5BE1}" dt="2026-02-06T15:28:28.324" v="46" actId="20577"/>
+          <ac:spMkLst>
+            <pc:docMk/>
+            <pc:sldMk cId="0" sldId="720"/>
+            <ac:spMk id="10" creationId="{0AF6651D-B3E2-5422-9B2D-9D01C07B1036}"/>
+          </ac:spMkLst>
+        </pc:spChg>
+        <pc:spChg chg="add mod">
+          <ac:chgData name="Shubham Hegishte" userId="bdee4fbff53a6376" providerId="LiveId" clId="{D66986CE-3744-4817-B2C5-7FA4B1ED5BE1}" dt="2026-02-04T14:44:07.319" v="16" actId="1076"/>
+          <ac:spMkLst>
+            <pc:docMk/>
+            <pc:sldMk cId="0" sldId="720"/>
+            <ac:spMk id="12" creationId="{F8D8CBBA-47BB-4392-4BD2-B357D59FD0AF}"/>
+          </ac:spMkLst>
+        </pc:spChg>
+        <pc:spChg chg="add mod">
+          <ac:chgData name="Shubham Hegishte" userId="bdee4fbff53a6376" providerId="LiveId" clId="{D66986CE-3744-4817-B2C5-7FA4B1ED5BE1}" dt="2026-02-06T15:23:25.791" v="44" actId="20577"/>
+          <ac:spMkLst>
+            <pc:docMk/>
+            <pc:sldMk cId="0" sldId="720"/>
+            <ac:spMk id="13" creationId="{E5088637-F81E-9B13-8DC2-EFF09E7D47DE}"/>
+          </ac:spMkLst>
+        </pc:spChg>
+        <pc:spChg chg="add mod">
+          <ac:chgData name="Shubham Hegishte" userId="bdee4fbff53a6376" providerId="LiveId" clId="{D66986CE-3744-4817-B2C5-7FA4B1ED5BE1}" dt="2026-02-06T15:23:14.073" v="38" actId="1076"/>
+          <ac:spMkLst>
+            <pc:docMk/>
+            <pc:sldMk cId="0" sldId="720"/>
+            <ac:spMk id="14" creationId="{96AE9584-9003-66C7-9DBC-F515309A6CA6}"/>
+          </ac:spMkLst>
+        </pc:spChg>
+        <pc:spChg chg="mod">
+          <ac:chgData name="Shubham Hegishte" userId="bdee4fbff53a6376" providerId="LiveId" clId="{D66986CE-3744-4817-B2C5-7FA4B1ED5BE1}" dt="2026-02-04T14:56:22.170" v="23" actId="14100"/>
+          <ac:spMkLst>
+            <pc:docMk/>
+            <pc:sldMk cId="0" sldId="720"/>
+            <ac:spMk id="1048600" creationId="{00000000-0000-0000-0000-000000000000}"/>
+          </ac:spMkLst>
+        </pc:spChg>
+        <pc:spChg chg="mod">
+          <ac:chgData name="Shubham Hegishte" userId="bdee4fbff53a6376" providerId="LiveId" clId="{D66986CE-3744-4817-B2C5-7FA4B1ED5BE1}" dt="2026-02-06T15:22:45.409" v="31" actId="20577"/>
+          <ac:spMkLst>
+            <pc:docMk/>
+            <pc:sldMk cId="0" sldId="720"/>
+            <ac:spMk id="1048603" creationId="{00000000-0000-0000-0000-000000000000}"/>
+          </ac:spMkLst>
+        </pc:spChg>
+        <pc:spChg chg="mod">
+          <ac:chgData name="Shubham Hegishte" userId="bdee4fbff53a6376" providerId="LiveId" clId="{D66986CE-3744-4817-B2C5-7FA4B1ED5BE1}" dt="2026-02-04T14:45:41.344" v="22" actId="20577"/>
+          <ac:spMkLst>
+            <pc:docMk/>
+            <pc:sldMk cId="0" sldId="720"/>
+            <ac:spMk id="1048605" creationId="{00000000-0000-0000-0000-000000000000}"/>
+          </ac:spMkLst>
+        </pc:spChg>
+      </pc:sldChg>
+      <pc:sldMasterChg chg="modSldLayout">
+        <pc:chgData name="Shubham Hegishte" userId="bdee4fbff53a6376" providerId="LiveId" clId="{D66986CE-3744-4817-B2C5-7FA4B1ED5BE1}" dt="2026-02-04T14:33:59.739" v="9" actId="962"/>
+        <pc:sldMasterMkLst>
+          <pc:docMk/>
+          <pc:sldMasterMk cId="0" sldId="2147483648"/>
+        </pc:sldMasterMkLst>
+        <pc:sldLayoutChg chg="addSp delSp modSp mod">
+          <pc:chgData name="Shubham Hegishte" userId="bdee4fbff53a6376" providerId="LiveId" clId="{D66986CE-3744-4817-B2C5-7FA4B1ED5BE1}" dt="2026-02-04T14:33:59.739" v="9" actId="962"/>
+          <pc:sldLayoutMkLst>
+            <pc:docMk/>
+            <pc:sldMasterMk cId="0" sldId="2147483648"/>
+            <pc:sldLayoutMk cId="0" sldId="2147483650"/>
+          </pc:sldLayoutMkLst>
+          <pc:spChg chg="add mod">
+            <ac:chgData name="Shubham Hegishte" userId="bdee4fbff53a6376" providerId="LiveId" clId="{D66986CE-3744-4817-B2C5-7FA4B1ED5BE1}" dt="2026-02-04T14:33:59.739" v="9" actId="962"/>
+            <ac:spMkLst>
+              <pc:docMk/>
+              <pc:sldMasterMk cId="0" sldId="2147483648"/>
+              <pc:sldLayoutMk cId="0" sldId="2147483650"/>
+              <ac:spMk id="3" creationId="{FB3E5157-572C-1252-545E-488A8232FA44}"/>
+            </ac:spMkLst>
+          </pc:spChg>
+        </pc:sldLayoutChg>
+      </pc:sldMasterChg>
+    </pc:docChg>
+  </pc:docChgLst>
+</pc:chgInfo>
+</file>
+
 <file path=ppt/handoutMasters/handoutMaster1.xml><?xml version="1.0" encoding="utf-8"?>
 <p:handoutMaster xmlns:a="http://schemas.openxmlformats.org/drawingml/2006/main" xmlns:r="http://schemas.openxmlformats.org/officeDocument/2006/relationships" xmlns:p="http://schemas.openxmlformats.org/presentationml/2006/main">
   <p:cSld>
@@ -232,7 +365,7 @@
           <a:p>
             <a:fld id="{C512A3C6-5DC9-4A56-9651-5479ABF6CC04}" type="datetimeFigureOut">
               <a:rPr lang="en-US" smtClean="0"/>
-              <a:t>12/29/2025</a:t>
+              <a:t>2/10/2026</a:t>
             </a:fld>
             <a:endParaRPr lang="en-US"/>
           </a:p>
@@ -397,7 +530,7 @@
           <a:p>
             <a:fld id="{EF9B4179-EA0F-480E-B68E-FD4684AB3DB5}" type="datetimeFigureOut">
               <a:rPr lang="en-IN" smtClean="0"/>
-              <a:t>29-12-2025</a:t>
+              <a:t>10-02-2026</a:t>
             </a:fld>
             <a:endParaRPr lang="en-IN"/>
           </a:p>
@@ -778,7 +911,7 @@
                   </a:prstClr>
                 </a:solidFill>
               </a:rPr>
-              <a:t>12/29/2025</a:t>
+              <a:t>2/10/2026</a:t>
             </a:fld>
             <a:endParaRPr lang="en-US">
               <a:solidFill>
@@ -845,7 +978,7 @@
 </file>
 
 <file path=ppt/slideLayouts/slideLayout2.xml><?xml version="1.0" encoding="utf-8"?>
-<p:sldLayout xmlns:a="http://schemas.openxmlformats.org/drawingml/2006/main" xmlns:r="http://schemas.openxmlformats.org/officeDocument/2006/relationships" xmlns:p="http://schemas.openxmlformats.org/presentationml/2006/main" type="obj" preserve="1">
+<p:sldLayout xmlns:a="http://schemas.openxmlformats.org/drawingml/2006/main" xmlns:r="http://schemas.openxmlformats.org/officeDocument/2006/relationships" xmlns:p="http://schemas.openxmlformats.org/presentationml/2006/main" preserve="1" userDrawn="1">
   <p:cSld name="Title and Content">
     <p:spTree>
       <p:nvGrpSpPr>
@@ -1007,7 +1140,7 @@
                   </a:prstClr>
                 </a:solidFill>
               </a:rPr>
-              <a:t>12/29/2025</a:t>
+              <a:t>2/10/2026</a:t>
             </a:fld>
             <a:endParaRPr lang="en-US">
               <a:solidFill>
@@ -1062,6 +1195,36 @@
                 <a:prstClr val="black"/>
               </a:solidFill>
             </a:endParaRPr>
+          </a:p>
+        </p:txBody>
+      </p:sp>
+      <p:sp>
+        <p:nvSpPr>
+          <p:cNvPr id="3" name="GREEN_PHOTO">
+            <a:extLst>
+              <a:ext uri="{FF2B5EF4-FFF2-40B4-BE49-F238E27FC236}">
+                <a16:creationId xmlns:a16="http://schemas.microsoft.com/office/drawing/2014/main" id="{FB3E5157-572C-1252-545E-488A8232FA44}"/>
+              </a:ext>
+            </a:extLst>
+          </p:cNvPr>
+          <p:cNvSpPr>
+            <a:spLocks noGrp="1"/>
+          </p:cNvSpPr>
+          <p:nvPr>
+            <p:ph type="pic" sz="quarter" idx="10"/>
+          </p:nvPr>
+        </p:nvSpPr>
+        <p:spPr>
+          <a:xfrm>
+            <a:off x="887413" y="1212850"/>
+            <a:ext cx="2209800" cy="990600"/>
+          </a:xfrm>
+        </p:spPr>
+        <p:txBody>
+          <a:bodyPr/>
+          <a:lstStyle/>
+          <a:p>
+            <a:endParaRPr lang="en-US" dirty="0"/>
           </a:p>
         </p:txBody>
       </p:sp>
@@ -1260,7 +1423,7 @@
                   </a:prstClr>
                 </a:solidFill>
               </a:rPr>
-              <a:t>12/29/2025</a:t>
+              <a:t>2/10/2026</a:t>
             </a:fld>
             <a:endParaRPr lang="en-US">
               <a:solidFill>
@@ -1463,7 +1626,7 @@
                   </a:prstClr>
                 </a:solidFill>
               </a:rPr>
-              <a:t>12/29/2025</a:t>
+              <a:t>2/10/2026</a:t>
             </a:fld>
             <a:endParaRPr lang="en-US">
               <a:solidFill>
@@ -1632,7 +1795,7 @@
                   </a:prstClr>
                 </a:solidFill>
               </a:rPr>
-              <a:t>12/29/2025</a:t>
+              <a:t>2/10/2026</a:t>
             </a:fld>
             <a:endParaRPr lang="en-US">
               <a:solidFill>
@@ -1925,7 +2088,7 @@
                   </a:prstClr>
                 </a:solidFill>
               </a:rPr>
-              <a:t>12/29/2025</a:t>
+              <a:t>2/10/2026</a:t>
             </a:fld>
             <a:endParaRPr lang="en-US" sz="1705">
               <a:solidFill>
@@ -2322,8 +2485,8 @@
         </p:nvSpPr>
         <p:spPr>
           <a:xfrm>
-            <a:off x="1476322" y="531903"/>
-            <a:ext cx="2483512" cy="422398"/>
+            <a:off x="1476321" y="531903"/>
+            <a:ext cx="4668097" cy="422398"/>
           </a:xfrm>
           <a:prstGeom prst="rect">
             <a:avLst/>
@@ -2556,8 +2719,8 @@
         </p:nvSpPr>
         <p:spPr>
           <a:xfrm>
-            <a:off x="670318" y="4426123"/>
-            <a:ext cx="2180900" cy="271390"/>
+            <a:off x="670317" y="4426123"/>
+            <a:ext cx="4762819" cy="135455"/>
           </a:xfrm>
           <a:prstGeom prst="rect">
             <a:avLst/>
@@ -2605,33 +2768,6 @@
               </a:rPr>
               <a:t>:</a:t>
             </a:r>
-          </a:p>
-          <a:p>
-            <a:pPr marL="183515" indent="-171450" defTabSz="880110">
-              <a:spcBef>
-                <a:spcPts val="95"/>
-              </a:spcBef>
-              <a:buFont typeface="Arial" panose="020B0604020202020204" pitchFamily="34" charset="0"/>
-              <a:buChar char="•"/>
-              <a:defRPr/>
-            </a:pPr>
-            <a:r>
-              <a:rPr lang="en-GB" sz="800" spc="-5" dirty="0">
-                <a:solidFill>
-                  <a:prstClr val="black"/>
-                </a:solidFill>
-                <a:latin typeface="Segoe UI" panose="020B0502040204020203" pitchFamily="34" charset="0"/>
-                <a:cs typeface="Segoe UI" panose="020B0502040204020203" pitchFamily="34" charset="0"/>
-              </a:rPr>
-              <a:t>{{APPLICATIONS}}</a:t>
-            </a:r>
-            <a:endParaRPr lang="en-US" sz="800" dirty="0">
-              <a:solidFill>
-                <a:prstClr val="black"/>
-              </a:solidFill>
-              <a:latin typeface="Segoe UI" panose="020B0502040204020203" pitchFamily="34" charset="0"/>
-              <a:cs typeface="Segoe UI" panose="020B0502040204020203" pitchFamily="34" charset="0"/>
-            </a:endParaRPr>
           </a:p>
         </p:txBody>
       </p:sp>
@@ -2749,7 +2885,7 @@
         <p:spPr>
           <a:xfrm>
             <a:off x="4392521" y="1365221"/>
-            <a:ext cx="2437698" cy="609629"/>
+            <a:ext cx="2437698" cy="809684"/>
           </a:xfrm>
           <a:prstGeom prst="rect">
             <a:avLst/>
@@ -2822,7 +2958,28 @@
               </a:rPr>
               <a:t>{{STUDENT_3}}</a:t>
             </a:r>
-            <a:endParaRPr sz="800" dirty="0">
+          </a:p>
+          <a:p>
+            <a:pPr marL="12065" defTabSz="880110">
+              <a:spcBef>
+                <a:spcPts val="600"/>
+              </a:spcBef>
+              <a:tabLst>
+                <a:tab pos="175895" algn="l"/>
+              </a:tabLst>
+              <a:defRPr/>
+            </a:pPr>
+            <a:r>
+              <a:rPr lang="en-US" sz="800" spc="-5" dirty="0">
+                <a:solidFill>
+                  <a:prstClr val="black"/>
+                </a:solidFill>
+                <a:latin typeface="Segoe UI" panose="020B0502040204020203" pitchFamily="34" charset="0"/>
+                <a:cs typeface="Segoe UI" panose="020B0502040204020203" pitchFamily="34" charset="0"/>
+              </a:rPr>
+              <a:t>{{STUDENT_4}}</a:t>
+            </a:r>
+            <a:endParaRPr lang="en-US" sz="800" dirty="0">
               <a:solidFill>
                 <a:prstClr val="black"/>
               </a:solidFill>
@@ -2939,7 +3096,7 @@
       </p:sp>
       <p:pic>
         <p:nvPicPr>
-          <p:cNvPr id="8" name="Picture 7"/>
+          <p:cNvPr id="11" name="Picture 10"/>
           <p:cNvPicPr>
             <a:picLocks noChangeAspect="1"/>
           </p:cNvPicPr>
@@ -2959,8 +3116,8 @@
         </p:blipFill>
         <p:spPr>
           <a:xfrm>
-            <a:off x="726769" y="3491553"/>
-            <a:ext cx="1474435" cy="825683"/>
+            <a:off x="2372764" y="3494784"/>
+            <a:ext cx="1436809" cy="808845"/>
           </a:xfrm>
           <a:prstGeom prst="rect">
             <a:avLst/>
@@ -2969,7 +3126,7 @@
       </p:pic>
       <p:pic>
         <p:nvPicPr>
-          <p:cNvPr id="11" name="Picture 10"/>
+          <p:cNvPr id="16" name="Picture 15"/>
           <p:cNvPicPr>
             <a:picLocks noChangeAspect="1"/>
           </p:cNvPicPr>
@@ -2989,36 +3146,6 @@
         </p:blipFill>
         <p:spPr>
           <a:xfrm>
-            <a:off x="2372764" y="3494784"/>
-            <a:ext cx="1436809" cy="808845"/>
-          </a:xfrm>
-          <a:prstGeom prst="rect">
-            <a:avLst/>
-          </a:prstGeom>
-        </p:spPr>
-      </p:pic>
-      <p:pic>
-        <p:nvPicPr>
-          <p:cNvPr id="16" name="Picture 15"/>
-          <p:cNvPicPr>
-            <a:picLocks noChangeAspect="1"/>
-          </p:cNvPicPr>
-          <p:nvPr/>
-        </p:nvPicPr>
-        <p:blipFill>
-          <a:blip r:embed="rId4" cstate="print">
-            <a:extLst>
-              <a:ext uri="{28A0092B-C50C-407E-A947-70E740481C1C}">
-                <a14:useLocalDpi xmlns:a14="http://schemas.microsoft.com/office/drawing/2010/main" val="0"/>
-              </a:ext>
-            </a:extLst>
-          </a:blip>
-          <a:stretch>
-            <a:fillRect/>
-          </a:stretch>
-        </p:blipFill>
-        <p:spPr>
-          <a:xfrm>
             <a:off x="869215" y="1223367"/>
             <a:ext cx="2227203" cy="997751"/>
           </a:xfrm>
@@ -3082,7 +3209,7 @@
         </p:nvSpPr>
         <p:spPr>
           <a:xfrm>
-            <a:off x="740741" y="3494784"/>
+            <a:off x="767436" y="3494784"/>
             <a:ext cx="1455045" cy="808845"/>
           </a:xfrm>
           <a:prstGeom prst="rect">
@@ -3235,6 +3362,232 @@
           <a:p>
             <a:pPr algn="ctr"/>
             <a:endParaRPr lang="en-US"/>
+          </a:p>
+        </p:txBody>
+      </p:sp>
+      <p:sp>
+        <p:nvSpPr>
+          <p:cNvPr id="12" name="Rectangle 11">
+            <a:extLst>
+              <a:ext uri="{FF2B5EF4-FFF2-40B4-BE49-F238E27FC236}">
+                <a16:creationId xmlns:a16="http://schemas.microsoft.com/office/drawing/2014/main" id="{F8D8CBBA-47BB-4392-4BD2-B357D59FD0AF}"/>
+              </a:ext>
+            </a:extLst>
+          </p:cNvPr>
+          <p:cNvSpPr/>
+          <p:nvPr/>
+        </p:nvSpPr>
+        <p:spPr>
+          <a:xfrm>
+            <a:off x="3978092" y="3506157"/>
+            <a:ext cx="1455045" cy="808845"/>
+          </a:xfrm>
+          <a:prstGeom prst="rect">
+            <a:avLst/>
+          </a:prstGeom>
+          <a:solidFill>
+            <a:schemeClr val="bg1"/>
+          </a:solidFill>
+          <a:ln>
+            <a:solidFill>
+              <a:schemeClr val="bg1"/>
+            </a:solidFill>
+          </a:ln>
+        </p:spPr>
+        <p:style>
+          <a:lnRef idx="2">
+            <a:schemeClr val="accent1">
+              <a:shade val="15000"/>
+            </a:schemeClr>
+          </a:lnRef>
+          <a:fillRef idx="1">
+            <a:schemeClr val="accent1"/>
+          </a:fillRef>
+          <a:effectRef idx="0">
+            <a:schemeClr val="accent1"/>
+          </a:effectRef>
+          <a:fontRef idx="minor">
+            <a:schemeClr val="lt1"/>
+          </a:fontRef>
+        </p:style>
+        <p:txBody>
+          <a:bodyPr rtlCol="0" anchor="ctr"/>
+          <a:lstStyle/>
+          <a:p>
+            <a:pPr algn="ctr"/>
+            <a:endParaRPr lang="en-US" dirty="0">
+              <a:solidFill>
+                <a:schemeClr val="tx1"/>
+              </a:solidFill>
+            </a:endParaRPr>
+          </a:p>
+        </p:txBody>
+      </p:sp>
+      <p:sp>
+        <p:nvSpPr>
+          <p:cNvPr id="8" name="TextBox 7">
+            <a:extLst>
+              <a:ext uri="{FF2B5EF4-FFF2-40B4-BE49-F238E27FC236}">
+                <a16:creationId xmlns:a16="http://schemas.microsoft.com/office/drawing/2014/main" id="{2B49B05E-B816-F429-B1B0-D318CDF6FBBB}"/>
+              </a:ext>
+            </a:extLst>
+          </p:cNvPr>
+          <p:cNvSpPr txBox="1"/>
+          <p:nvPr/>
+        </p:nvSpPr>
+        <p:spPr>
+          <a:xfrm>
+            <a:off x="670317" y="4548814"/>
+            <a:ext cx="2180900" cy="215444"/>
+          </a:xfrm>
+          <a:prstGeom prst="rect">
+            <a:avLst/>
+          </a:prstGeom>
+          <a:noFill/>
+        </p:spPr>
+        <p:txBody>
+          <a:bodyPr wrap="square" rtlCol="0">
+            <a:spAutoFit/>
+          </a:bodyPr>
+          <a:lstStyle/>
+          <a:p>
+            <a:pPr marL="171450" indent="-171450">
+              <a:buFont typeface="Arial" panose="020B0604020202020204" pitchFamily="34" charset="0"/>
+              <a:buChar char="•"/>
+            </a:pPr>
+            <a:r>
+              <a:rPr lang="en-US" sz="800" dirty="0">
+                <a:latin typeface="Segoe UI" panose="020B0502040204020203" pitchFamily="34" charset="0"/>
+                <a:cs typeface="Segoe UI" panose="020B0502040204020203" pitchFamily="34" charset="0"/>
+              </a:rPr>
+              <a:t>{{APPLICATION_1}}</a:t>
+            </a:r>
+          </a:p>
+        </p:txBody>
+      </p:sp>
+      <p:sp>
+        <p:nvSpPr>
+          <p:cNvPr id="10" name="TextBox 9">
+            <a:extLst>
+              <a:ext uri="{FF2B5EF4-FFF2-40B4-BE49-F238E27FC236}">
+                <a16:creationId xmlns:a16="http://schemas.microsoft.com/office/drawing/2014/main" id="{0AF6651D-B3E2-5422-9B2D-9D01C07B1036}"/>
+              </a:ext>
+            </a:extLst>
+          </p:cNvPr>
+          <p:cNvSpPr txBox="1"/>
+          <p:nvPr/>
+        </p:nvSpPr>
+        <p:spPr>
+          <a:xfrm>
+            <a:off x="670317" y="4692880"/>
+            <a:ext cx="2180900" cy="215444"/>
+          </a:xfrm>
+          <a:prstGeom prst="rect">
+            <a:avLst/>
+          </a:prstGeom>
+          <a:noFill/>
+        </p:spPr>
+        <p:txBody>
+          <a:bodyPr wrap="square" rtlCol="0">
+            <a:spAutoFit/>
+          </a:bodyPr>
+          <a:lstStyle/>
+          <a:p>
+            <a:pPr marL="171450" indent="-171450">
+              <a:buFont typeface="Arial" panose="020B0604020202020204" pitchFamily="34" charset="0"/>
+              <a:buChar char="•"/>
+            </a:pPr>
+            <a:r>
+              <a:rPr lang="en-US" sz="800" dirty="0">
+                <a:latin typeface="Segoe UI" panose="020B0502040204020203" pitchFamily="34" charset="0"/>
+                <a:cs typeface="Segoe UI" panose="020B0502040204020203" pitchFamily="34" charset="0"/>
+              </a:rPr>
+              <a:t>{{APPLICATION_2}}</a:t>
+            </a:r>
+          </a:p>
+        </p:txBody>
+      </p:sp>
+      <p:sp>
+        <p:nvSpPr>
+          <p:cNvPr id="13" name="TextBox 12">
+            <a:extLst>
+              <a:ext uri="{FF2B5EF4-FFF2-40B4-BE49-F238E27FC236}">
+                <a16:creationId xmlns:a16="http://schemas.microsoft.com/office/drawing/2014/main" id="{E5088637-F81E-9B13-8DC2-EFF09E7D47DE}"/>
+              </a:ext>
+            </a:extLst>
+          </p:cNvPr>
+          <p:cNvSpPr txBox="1"/>
+          <p:nvPr/>
+        </p:nvSpPr>
+        <p:spPr>
+          <a:xfrm>
+            <a:off x="670317" y="4847543"/>
+            <a:ext cx="2180900" cy="215444"/>
+          </a:xfrm>
+          <a:prstGeom prst="rect">
+            <a:avLst/>
+          </a:prstGeom>
+          <a:noFill/>
+        </p:spPr>
+        <p:txBody>
+          <a:bodyPr wrap="square" rtlCol="0">
+            <a:spAutoFit/>
+          </a:bodyPr>
+          <a:lstStyle/>
+          <a:p>
+            <a:pPr marL="171450" indent="-171450">
+              <a:buFont typeface="Arial" panose="020B0604020202020204" pitchFamily="34" charset="0"/>
+              <a:buChar char="•"/>
+            </a:pPr>
+            <a:r>
+              <a:rPr lang="en-US" sz="800" dirty="0">
+                <a:latin typeface="Segoe UI" panose="020B0502040204020203" pitchFamily="34" charset="0"/>
+                <a:cs typeface="Segoe UI" panose="020B0502040204020203" pitchFamily="34" charset="0"/>
+              </a:rPr>
+              <a:t>{{APPLICATION_3}}</a:t>
+            </a:r>
+          </a:p>
+        </p:txBody>
+      </p:sp>
+      <p:sp>
+        <p:nvSpPr>
+          <p:cNvPr id="14" name="TextBox 13">
+            <a:extLst>
+              <a:ext uri="{FF2B5EF4-FFF2-40B4-BE49-F238E27FC236}">
+                <a16:creationId xmlns:a16="http://schemas.microsoft.com/office/drawing/2014/main" id="{96AE9584-9003-66C7-9DBC-F515309A6CA6}"/>
+              </a:ext>
+            </a:extLst>
+          </p:cNvPr>
+          <p:cNvSpPr txBox="1"/>
+          <p:nvPr/>
+        </p:nvSpPr>
+        <p:spPr>
+          <a:xfrm>
+            <a:off x="670317" y="5001929"/>
+            <a:ext cx="2180900" cy="215444"/>
+          </a:xfrm>
+          <a:prstGeom prst="rect">
+            <a:avLst/>
+          </a:prstGeom>
+          <a:noFill/>
+        </p:spPr>
+        <p:txBody>
+          <a:bodyPr wrap="square" rtlCol="0">
+            <a:spAutoFit/>
+          </a:bodyPr>
+          <a:lstStyle/>
+          <a:p>
+            <a:pPr marL="171450" indent="-171450">
+              <a:buFont typeface="Arial" panose="020B0604020202020204" pitchFamily="34" charset="0"/>
+              <a:buChar char="•"/>
+            </a:pPr>
+            <a:r>
+              <a:rPr lang="en-US" sz="800" dirty="0">
+                <a:latin typeface="Segoe UI" panose="020B0502040204020203" pitchFamily="34" charset="0"/>
+                <a:cs typeface="Segoe UI" panose="020B0502040204020203" pitchFamily="34" charset="0"/>
+              </a:rPr>
+              <a:t>{{APPLICATION_4}}</a:t>
+            </a:r>
           </a:p>
         </p:txBody>
       </p:sp>
@@ -4115,6 +4468,12 @@
 </file>
 
 <file path=customXml/item1.xml><?xml version="1.0" encoding="utf-8"?>
+<p:properties xmlns:p="http://schemas.microsoft.com/office/2006/metadata/properties" xmlns:xsi="http://www.w3.org/2001/XMLSchema-instance" xmlns:pc="http://schemas.microsoft.com/office/infopath/2007/PartnerControls">
+  <documentManagement/>
+</p:properties>
+</file>
+
+<file path=customXml/item2.xml><?xml version="1.0" encoding="utf-8"?>
 <ct:contentTypeSchema xmlns:ct="http://schemas.microsoft.com/office/2006/metadata/contentType" xmlns:ma="http://schemas.microsoft.com/office/2006/metadata/properties/metaAttributes" ct:_="" ma:_="" ma:contentTypeName="Document" ma:contentTypeID="0x0101004CF57B6CAEEF3646817B2F81D43B2593" ma:contentTypeVersion="3" ma:contentTypeDescription="Create a new document." ma:contentTypeScope="" ma:versionID="d459494d80b92255f5464325ec0b7c29">
   <xsd:schema xmlns:xsd="http://www.w3.org/2001/XMLSchema" xmlns:xs="http://www.w3.org/2001/XMLSchema" xmlns:p="http://schemas.microsoft.com/office/2006/metadata/properties" xmlns:ns2="6c8bfbdf-9cd7-450c-b6ef-a8b7e97a09ad" targetNamespace="http://schemas.microsoft.com/office/2006/metadata/properties" ma:root="true" ma:fieldsID="7a36c638fb05d79d4deeed5bca265548" ns2:_="">
     <xsd:import namespace="6c8bfbdf-9cd7-450c-b6ef-a8b7e97a09ad"/>
@@ -4252,7 +4611,7 @@
 </ct:contentTypeSchema>
 </file>
 
-<file path=customXml/item2.xml><?xml version="1.0" encoding="utf-8"?>
+<file path=customXml/item3.xml><?xml version="1.0" encoding="utf-8"?>
 <?mso-contentType ?>
 <FormTemplates xmlns="http://schemas.microsoft.com/sharepoint/v3/contenttype/forms">
   <Display>DocumentLibraryForm</Display>
@@ -4261,26 +4620,20 @@
 </FormTemplates>
 </file>
 
-<file path=customXml/item3.xml><?xml version="1.0" encoding="utf-8"?>
-<p:properties xmlns:p="http://schemas.microsoft.com/office/2006/metadata/properties" xmlns:xsi="http://www.w3.org/2001/XMLSchema-instance" xmlns:pc="http://schemas.microsoft.com/office/infopath/2007/PartnerControls">
-  <documentManagement/>
-</p:properties>
+<file path=customXml/itemProps1.xml><?xml version="1.0" encoding="utf-8"?>
+<ds:datastoreItem xmlns:ds="http://schemas.openxmlformats.org/officeDocument/2006/customXml" ds:itemID="{34235259-FEDA-42D5-91F1-405D83F92214}">
+  <ds:schemaRefs/>
+</ds:datastoreItem>
 </file>
 
-<file path=customXml/itemProps1.xml><?xml version="1.0" encoding="utf-8"?>
+<file path=customXml/itemProps2.xml><?xml version="1.0" encoding="utf-8"?>
 <ds:datastoreItem xmlns:ds="http://schemas.openxmlformats.org/officeDocument/2006/customXml" ds:itemID="{9C53AADE-7CB0-4DCA-A225-EE77CF809E0A}">
   <ds:schemaRefs/>
 </ds:datastoreItem>
 </file>
 
-<file path=customXml/itemProps2.xml><?xml version="1.0" encoding="utf-8"?>
+<file path=customXml/itemProps3.xml><?xml version="1.0" encoding="utf-8"?>
 <ds:datastoreItem xmlns:ds="http://schemas.openxmlformats.org/officeDocument/2006/customXml" ds:itemID="{89B0D1F0-95F1-4026-A94A-A8761D16E918}">
   <ds:schemaRefs/>
 </ds:datastoreItem>
-</file>
-
-<file path=customXml/itemProps3.xml><?xml version="1.0" encoding="utf-8"?>
-<ds:datastoreItem xmlns:ds="http://schemas.openxmlformats.org/officeDocument/2006/customXml" ds:itemID="{34235259-FEDA-42D5-91F1-405D83F92214}">
-  <ds:schemaRefs/>
-</ds:datastoreItem>
 </file>
</xml_diff>